<commit_message>
Updates to week 1 material
</commit_message>
<xml_diff>
--- a/01 Intro + Opsamling + Interfaces/OO recap.pptx
+++ b/01 Intro + Opsamling + Interfaces/OO recap.pptx
@@ -7258,7 +7258,7 @@
     <mc:Choice Requires="p14">
       <p:transition p14:dur="10"/>
     </mc:Choice>
-    <mc:Fallback xmlns="" xmlns:p15="http://schemas.microsoft.com/office/powerpoint/2012/main">
+    <mc:Fallback xmlns:p15="http://schemas.microsoft.com/office/powerpoint/2012/main" xmlns="">
       <p:transition/>
     </mc:Fallback>
   </mc:AlternateContent>
@@ -7670,7 +7670,7 @@
     <mc:Choice Requires="p14">
       <p:transition p14:dur="10"/>
     </mc:Choice>
-    <mc:Fallback xmlns="" xmlns:p15="http://schemas.microsoft.com/office/powerpoint/2012/main">
+    <mc:Fallback xmlns:p15="http://schemas.microsoft.com/office/powerpoint/2012/main" xmlns="">
       <p:transition/>
     </mc:Fallback>
   </mc:AlternateContent>
@@ -8340,7 +8340,7 @@
     <mc:Choice Requires="p14">
       <p:transition p14:dur="10"/>
     </mc:Choice>
-    <mc:Fallback xmlns="" xmlns:p15="http://schemas.microsoft.com/office/powerpoint/2012/main">
+    <mc:Fallback xmlns:p15="http://schemas.microsoft.com/office/powerpoint/2012/main" xmlns="">
       <p:transition/>
     </mc:Fallback>
   </mc:AlternateContent>
@@ -9674,7 +9674,7 @@
     <mc:Choice Requires="p14">
       <p:transition p14:dur="10"/>
     </mc:Choice>
-    <mc:Fallback xmlns="" xmlns:p15="http://schemas.microsoft.com/office/powerpoint/2012/main">
+    <mc:Fallback xmlns:p15="http://schemas.microsoft.com/office/powerpoint/2012/main" xmlns="">
       <p:transition/>
     </mc:Fallback>
   </mc:AlternateContent>
@@ -11415,7 +11415,7 @@
     <mc:Choice Requires="p14">
       <p:transition p14:dur="10"/>
     </mc:Choice>
-    <mc:Fallback xmlns="" xmlns:p15="http://schemas.microsoft.com/office/powerpoint/2012/main">
+    <mc:Fallback xmlns:p15="http://schemas.microsoft.com/office/powerpoint/2012/main" xmlns="">
       <p:transition/>
     </mc:Fallback>
   </mc:AlternateContent>
@@ -12936,7 +12936,7 @@
     <mc:Choice Requires="p14">
       <p:transition p14:dur="10"/>
     </mc:Choice>
-    <mc:Fallback xmlns="" xmlns:p15="http://schemas.microsoft.com/office/powerpoint/2012/main">
+    <mc:Fallback xmlns:p15="http://schemas.microsoft.com/office/powerpoint/2012/main" xmlns="">
       <p:transition/>
     </mc:Fallback>
   </mc:AlternateContent>
@@ -13311,7 +13311,7 @@
     <mc:Choice Requires="p14">
       <p:transition p14:dur="10"/>
     </mc:Choice>
-    <mc:Fallback xmlns="" xmlns:p15="http://schemas.microsoft.com/office/powerpoint/2012/main">
+    <mc:Fallback xmlns:p15="http://schemas.microsoft.com/office/powerpoint/2012/main" xmlns="">
       <p:transition/>
     </mc:Fallback>
   </mc:AlternateContent>
@@ -13619,7 +13619,7 @@
     <mc:Choice Requires="p14">
       <p:transition p14:dur="10"/>
     </mc:Choice>
-    <mc:Fallback xmlns="" xmlns:p15="http://schemas.microsoft.com/office/powerpoint/2012/main">
+    <mc:Fallback xmlns:p15="http://schemas.microsoft.com/office/powerpoint/2012/main" xmlns="">
       <p:transition/>
     </mc:Fallback>
   </mc:AlternateContent>
@@ -14113,7 +14113,7 @@
     <mc:Choice Requires="p14">
       <p:transition p14:dur="10"/>
     </mc:Choice>
-    <mc:Fallback xmlns="" xmlns:p15="http://schemas.microsoft.com/office/powerpoint/2012/main">
+    <mc:Fallback xmlns:p15="http://schemas.microsoft.com/office/powerpoint/2012/main" xmlns="">
       <p:transition/>
     </mc:Fallback>
   </mc:AlternateContent>
@@ -14619,7 +14619,7 @@
     <mc:Choice Requires="p14">
       <p:transition p14:dur="10"/>
     </mc:Choice>
-    <mc:Fallback xmlns="" xmlns:p15="http://schemas.microsoft.com/office/powerpoint/2012/main">
+    <mc:Fallback xmlns:p15="http://schemas.microsoft.com/office/powerpoint/2012/main" xmlns="">
       <p:transition/>
     </mc:Fallback>
   </mc:AlternateContent>
@@ -15770,7 +15770,7 @@
     <mc:Choice Requires="p14">
       <p:transition p14:dur="10"/>
     </mc:Choice>
-    <mc:Fallback xmlns="" xmlns:p15="http://schemas.microsoft.com/office/powerpoint/2012/main">
+    <mc:Fallback xmlns:p15="http://schemas.microsoft.com/office/powerpoint/2012/main" xmlns="">
       <p:transition/>
     </mc:Fallback>
   </mc:AlternateContent>
@@ -16146,7 +16146,7 @@
     <mc:Choice Requires="p14">
       <p:transition p14:dur="10"/>
     </mc:Choice>
-    <mc:Fallback xmlns="" xmlns:p15="http://schemas.microsoft.com/office/powerpoint/2012/main">
+    <mc:Fallback xmlns:p15="http://schemas.microsoft.com/office/powerpoint/2012/main" xmlns="">
       <p:transition/>
     </mc:Fallback>
   </mc:AlternateContent>
@@ -16940,7 +16940,7 @@
     <mc:Choice Requires="p14">
       <p:transition p14:dur="10"/>
     </mc:Choice>
-    <mc:Fallback xmlns="" xmlns:p15="http://schemas.microsoft.com/office/powerpoint/2012/main">
+    <mc:Fallback xmlns:p15="http://schemas.microsoft.com/office/powerpoint/2012/main" xmlns="">
       <p:transition/>
     </mc:Fallback>
   </mc:AlternateContent>
@@ -18675,7 +18675,7 @@
     <mc:Choice Requires="p14">
       <p:transition p14:dur="10"/>
     </mc:Choice>
-    <mc:Fallback xmlns="" xmlns:p15="http://schemas.microsoft.com/office/powerpoint/2012/main">
+    <mc:Fallback xmlns:p15="http://schemas.microsoft.com/office/powerpoint/2012/main" xmlns="">
       <p:transition/>
     </mc:Fallback>
   </mc:AlternateContent>
@@ -19147,7 +19147,7 @@
     <mc:Choice Requires="p14">
       <p:transition p14:dur="10"/>
     </mc:Choice>
-    <mc:Fallback xmlns="" xmlns:p15="http://schemas.microsoft.com/office/powerpoint/2012/main">
+    <mc:Fallback xmlns:p15="http://schemas.microsoft.com/office/powerpoint/2012/main" xmlns="">
       <p:transition/>
     </mc:Fallback>
   </mc:AlternateContent>
@@ -19394,7 +19394,7 @@
     <mc:Choice Requires="p14">
       <p:transition p14:dur="10"/>
     </mc:Choice>
-    <mc:Fallback xmlns="" xmlns:p15="http://schemas.microsoft.com/office/powerpoint/2012/main">
+    <mc:Fallback xmlns:p15="http://schemas.microsoft.com/office/powerpoint/2012/main" xmlns="">
       <p:transition/>
     </mc:Fallback>
   </mc:AlternateContent>
@@ -19523,7 +19523,7 @@
     <mc:Choice Requires="p14">
       <p:transition p14:dur="10"/>
     </mc:Choice>
-    <mc:Fallback xmlns="" xmlns:p15="http://schemas.microsoft.com/office/powerpoint/2012/main">
+    <mc:Fallback xmlns:p15="http://schemas.microsoft.com/office/powerpoint/2012/main" xmlns="">
       <p:transition/>
     </mc:Fallback>
   </mc:AlternateContent>
@@ -19811,7 +19811,7 @@
     <mc:Choice Requires="p14">
       <p:transition p14:dur="10"/>
     </mc:Choice>
-    <mc:Fallback xmlns="" xmlns:p15="http://schemas.microsoft.com/office/powerpoint/2012/main">
+    <mc:Fallback xmlns:p15="http://schemas.microsoft.com/office/powerpoint/2012/main" xmlns="">
       <p:transition/>
     </mc:Fallback>
   </mc:AlternateContent>
@@ -20709,7 +20709,7 @@
     <mc:Choice Requires="p14">
       <p:transition p14:dur="10"/>
     </mc:Choice>
-    <mc:Fallback xmlns="" xmlns:p15="http://schemas.microsoft.com/office/powerpoint/2012/main">
+    <mc:Fallback xmlns:p15="http://schemas.microsoft.com/office/powerpoint/2012/main" xmlns="">
       <p:transition/>
     </mc:Fallback>
   </mc:AlternateContent>
@@ -21208,7 +21208,7 @@
     <mc:Choice Requires="p14">
       <p:transition p14:dur="10"/>
     </mc:Choice>
-    <mc:Fallback xmlns="" xmlns:p15="http://schemas.microsoft.com/office/powerpoint/2012/main">
+    <mc:Fallback xmlns:p15="http://schemas.microsoft.com/office/powerpoint/2012/main" xmlns="">
       <p:transition/>
     </mc:Fallback>
   </mc:AlternateContent>
@@ -22056,7 +22056,7 @@
     <mc:Choice Requires="p14">
       <p:transition p14:dur="10"/>
     </mc:Choice>
-    <mc:Fallback xmlns="" xmlns:p15="http://schemas.microsoft.com/office/powerpoint/2012/main">
+    <mc:Fallback xmlns:p15="http://schemas.microsoft.com/office/powerpoint/2012/main" xmlns="">
       <p:transition/>
     </mc:Fallback>
   </mc:AlternateContent>
@@ -22364,7 +22364,7 @@
     <mc:Choice Requires="p14">
       <p:transition p14:dur="10"/>
     </mc:Choice>
-    <mc:Fallback xmlns="" xmlns:p15="http://schemas.microsoft.com/office/powerpoint/2012/main">
+    <mc:Fallback xmlns:p15="http://schemas.microsoft.com/office/powerpoint/2012/main" xmlns="">
       <p:transition/>
     </mc:Fallback>
   </mc:AlternateContent>
@@ -22519,7 +22519,7 @@
     <mc:Choice Requires="p14">
       <p:transition p14:dur="10"/>
     </mc:Choice>
-    <mc:Fallback xmlns="" xmlns:p15="http://schemas.microsoft.com/office/powerpoint/2012/main">
+    <mc:Fallback xmlns:p15="http://schemas.microsoft.com/office/powerpoint/2012/main" xmlns="">
       <p:transition/>
     </mc:Fallback>
   </mc:AlternateContent>

</xml_diff>

<commit_message>
Updates to recap slideset
</commit_message>
<xml_diff>
--- a/01 Intro + Opsamling + Interfaces/OO recap.pptx
+++ b/01 Intro + Opsamling + Interfaces/OO recap.pptx
@@ -7258,7 +7258,7 @@
     <mc:Choice Requires="p14">
       <p:transition p14:dur="10"/>
     </mc:Choice>
-    <mc:Fallback xmlns:p15="http://schemas.microsoft.com/office/powerpoint/2012/main" xmlns="">
+    <mc:Fallback xmlns="" xmlns:p15="http://schemas.microsoft.com/office/powerpoint/2012/main">
       <p:transition/>
     </mc:Fallback>
   </mc:AlternateContent>
@@ -7338,7 +7338,7 @@
         </p:nvSpPr>
         <p:spPr>
           <a:xfrm>
-            <a:off x="457200" y="1556640"/>
+            <a:off x="476460" y="1385640"/>
             <a:ext cx="8229240" cy="4680000"/>
           </a:xfrm>
           <a:prstGeom prst="rect">
@@ -7670,7 +7670,7 @@
     <mc:Choice Requires="p14">
       <p:transition p14:dur="10"/>
     </mc:Choice>
-    <mc:Fallback xmlns:p15="http://schemas.microsoft.com/office/powerpoint/2012/main" xmlns="">
+    <mc:Fallback xmlns="" xmlns:p15="http://schemas.microsoft.com/office/powerpoint/2012/main">
       <p:transition/>
     </mc:Fallback>
   </mc:AlternateContent>
@@ -8340,7 +8340,7 @@
     <mc:Choice Requires="p14">
       <p:transition p14:dur="10"/>
     </mc:Choice>
-    <mc:Fallback xmlns:p15="http://schemas.microsoft.com/office/powerpoint/2012/main" xmlns="">
+    <mc:Fallback xmlns="" xmlns:p15="http://schemas.microsoft.com/office/powerpoint/2012/main">
       <p:transition/>
     </mc:Fallback>
   </mc:AlternateContent>
@@ -9674,7 +9674,7 @@
     <mc:Choice Requires="p14">
       <p:transition p14:dur="10"/>
     </mc:Choice>
-    <mc:Fallback xmlns:p15="http://schemas.microsoft.com/office/powerpoint/2012/main" xmlns="">
+    <mc:Fallback xmlns="" xmlns:p15="http://schemas.microsoft.com/office/powerpoint/2012/main">
       <p:transition/>
     </mc:Fallback>
   </mc:AlternateContent>
@@ -11415,7 +11415,7 @@
     <mc:Choice Requires="p14">
       <p:transition p14:dur="10"/>
     </mc:Choice>
-    <mc:Fallback xmlns:p15="http://schemas.microsoft.com/office/powerpoint/2012/main" xmlns="">
+    <mc:Fallback xmlns="" xmlns:p15="http://schemas.microsoft.com/office/powerpoint/2012/main">
       <p:transition/>
     </mc:Fallback>
   </mc:AlternateContent>
@@ -12936,7 +12936,7 @@
     <mc:Choice Requires="p14">
       <p:transition p14:dur="10"/>
     </mc:Choice>
-    <mc:Fallback xmlns:p15="http://schemas.microsoft.com/office/powerpoint/2012/main" xmlns="">
+    <mc:Fallback xmlns="" xmlns:p15="http://schemas.microsoft.com/office/powerpoint/2012/main">
       <p:transition/>
     </mc:Fallback>
   </mc:AlternateContent>
@@ -13311,7 +13311,7 @@
     <mc:Choice Requires="p14">
       <p:transition p14:dur="10"/>
     </mc:Choice>
-    <mc:Fallback xmlns:p15="http://schemas.microsoft.com/office/powerpoint/2012/main" xmlns="">
+    <mc:Fallback xmlns="" xmlns:p15="http://schemas.microsoft.com/office/powerpoint/2012/main">
       <p:transition/>
     </mc:Fallback>
   </mc:AlternateContent>
@@ -13619,7 +13619,7 @@
     <mc:Choice Requires="p14">
       <p:transition p14:dur="10"/>
     </mc:Choice>
-    <mc:Fallback xmlns:p15="http://schemas.microsoft.com/office/powerpoint/2012/main" xmlns="">
+    <mc:Fallback xmlns="" xmlns:p15="http://schemas.microsoft.com/office/powerpoint/2012/main">
       <p:transition/>
     </mc:Fallback>
   </mc:AlternateContent>
@@ -14113,7 +14113,7 @@
     <mc:Choice Requires="p14">
       <p:transition p14:dur="10"/>
     </mc:Choice>
-    <mc:Fallback xmlns:p15="http://schemas.microsoft.com/office/powerpoint/2012/main" xmlns="">
+    <mc:Fallback xmlns="" xmlns:p15="http://schemas.microsoft.com/office/powerpoint/2012/main">
       <p:transition/>
     </mc:Fallback>
   </mc:AlternateContent>
@@ -14619,7 +14619,7 @@
     <mc:Choice Requires="p14">
       <p:transition p14:dur="10"/>
     </mc:Choice>
-    <mc:Fallback xmlns:p15="http://schemas.microsoft.com/office/powerpoint/2012/main" xmlns="">
+    <mc:Fallback xmlns="" xmlns:p15="http://schemas.microsoft.com/office/powerpoint/2012/main">
       <p:transition/>
     </mc:Fallback>
   </mc:AlternateContent>
@@ -15770,7 +15770,7 @@
     <mc:Choice Requires="p14">
       <p:transition p14:dur="10"/>
     </mc:Choice>
-    <mc:Fallback xmlns:p15="http://schemas.microsoft.com/office/powerpoint/2012/main" xmlns="">
+    <mc:Fallback xmlns="" xmlns:p15="http://schemas.microsoft.com/office/powerpoint/2012/main">
       <p:transition/>
     </mc:Fallback>
   </mc:AlternateContent>
@@ -16146,7 +16146,7 @@
     <mc:Choice Requires="p14">
       <p:transition p14:dur="10"/>
     </mc:Choice>
-    <mc:Fallback xmlns:p15="http://schemas.microsoft.com/office/powerpoint/2012/main" xmlns="">
+    <mc:Fallback xmlns="" xmlns:p15="http://schemas.microsoft.com/office/powerpoint/2012/main">
       <p:transition/>
     </mc:Fallback>
   </mc:AlternateContent>
@@ -16940,7 +16940,7 @@
     <mc:Choice Requires="p14">
       <p:transition p14:dur="10"/>
     </mc:Choice>
-    <mc:Fallback xmlns:p15="http://schemas.microsoft.com/office/powerpoint/2012/main" xmlns="">
+    <mc:Fallback xmlns="" xmlns:p15="http://schemas.microsoft.com/office/powerpoint/2012/main">
       <p:transition/>
     </mc:Fallback>
   </mc:AlternateContent>
@@ -18675,7 +18675,7 @@
     <mc:Choice Requires="p14">
       <p:transition p14:dur="10"/>
     </mc:Choice>
-    <mc:Fallback xmlns:p15="http://schemas.microsoft.com/office/powerpoint/2012/main" xmlns="">
+    <mc:Fallback xmlns="" xmlns:p15="http://schemas.microsoft.com/office/powerpoint/2012/main">
       <p:transition/>
     </mc:Fallback>
   </mc:AlternateContent>
@@ -19147,7 +19147,7 @@
     <mc:Choice Requires="p14">
       <p:transition p14:dur="10"/>
     </mc:Choice>
-    <mc:Fallback xmlns:p15="http://schemas.microsoft.com/office/powerpoint/2012/main" xmlns="">
+    <mc:Fallback xmlns="" xmlns:p15="http://schemas.microsoft.com/office/powerpoint/2012/main">
       <p:transition/>
     </mc:Fallback>
   </mc:AlternateContent>
@@ -19394,7 +19394,7 @@
     <mc:Choice Requires="p14">
       <p:transition p14:dur="10"/>
     </mc:Choice>
-    <mc:Fallback xmlns:p15="http://schemas.microsoft.com/office/powerpoint/2012/main" xmlns="">
+    <mc:Fallback xmlns="" xmlns:p15="http://schemas.microsoft.com/office/powerpoint/2012/main">
       <p:transition/>
     </mc:Fallback>
   </mc:AlternateContent>
@@ -19523,7 +19523,7 @@
     <mc:Choice Requires="p14">
       <p:transition p14:dur="10"/>
     </mc:Choice>
-    <mc:Fallback xmlns:p15="http://schemas.microsoft.com/office/powerpoint/2012/main" xmlns="">
+    <mc:Fallback xmlns="" xmlns:p15="http://schemas.microsoft.com/office/powerpoint/2012/main">
       <p:transition/>
     </mc:Fallback>
   </mc:AlternateContent>
@@ -19634,15 +19634,132 @@
               <a:buChar char="•"/>
             </a:pPr>
             <a:r>
-              <a:rPr lang="da-DK" sz="2400" b="0" strike="noStrike" spc="-1">
+              <a:rPr lang="da-DK" sz="2400" b="0" strike="noStrike" spc="-1" dirty="0" err="1">
                 <a:solidFill>
                   <a:srgbClr val="000000"/>
                 </a:solidFill>
                 <a:latin typeface="Calibri"/>
               </a:rPr>
-              <a:t>Inheritance is often called an ”is-a”-relation. What does this mean?</a:t>
-            </a:r>
-            <a:endParaRPr lang="en-US" sz="2400" b="0" strike="noStrike" spc="-1">
+              <a:t>Inheritance</a:t>
+            </a:r>
+            <a:r>
+              <a:rPr lang="da-DK" sz="2400" b="0" strike="noStrike" spc="-1" dirty="0">
+                <a:solidFill>
+                  <a:srgbClr val="000000"/>
+                </a:solidFill>
+                <a:latin typeface="Calibri"/>
+              </a:rPr>
+              <a:t> is </a:t>
+            </a:r>
+            <a:r>
+              <a:rPr lang="da-DK" sz="2400" b="0" strike="noStrike" spc="-1" dirty="0" err="1">
+                <a:solidFill>
+                  <a:srgbClr val="000000"/>
+                </a:solidFill>
+                <a:latin typeface="Calibri"/>
+              </a:rPr>
+              <a:t>often</a:t>
+            </a:r>
+            <a:r>
+              <a:rPr lang="da-DK" sz="2400" b="0" strike="noStrike" spc="-1" dirty="0">
+                <a:solidFill>
+                  <a:srgbClr val="000000"/>
+                </a:solidFill>
+                <a:latin typeface="Calibri"/>
+              </a:rPr>
+              <a:t> </a:t>
+            </a:r>
+            <a:r>
+              <a:rPr lang="da-DK" sz="2400" b="0" strike="noStrike" spc="-1" dirty="0" err="1">
+                <a:solidFill>
+                  <a:srgbClr val="000000"/>
+                </a:solidFill>
+                <a:latin typeface="Calibri"/>
+              </a:rPr>
+              <a:t>called</a:t>
+            </a:r>
+            <a:r>
+              <a:rPr lang="da-DK" sz="2400" b="0" strike="noStrike" spc="-1" dirty="0">
+                <a:solidFill>
+                  <a:srgbClr val="000000"/>
+                </a:solidFill>
+                <a:latin typeface="Calibri"/>
+              </a:rPr>
+              <a:t> an ”is-a”-relation. </a:t>
+            </a:r>
+            <a:r>
+              <a:rPr lang="da-DK" sz="2400" b="0" strike="noStrike" spc="-1" dirty="0" err="1">
+                <a:solidFill>
+                  <a:srgbClr val="000000"/>
+                </a:solidFill>
+                <a:latin typeface="Calibri"/>
+              </a:rPr>
+              <a:t>What</a:t>
+            </a:r>
+            <a:r>
+              <a:rPr lang="da-DK" sz="2400" b="0" strike="noStrike" spc="-1" dirty="0">
+                <a:solidFill>
+                  <a:srgbClr val="000000"/>
+                </a:solidFill>
+                <a:latin typeface="Calibri"/>
+              </a:rPr>
+              <a:t> </a:t>
+            </a:r>
+            <a:r>
+              <a:rPr lang="da-DK" sz="2400" b="0" strike="noStrike" spc="-1" dirty="0" err="1">
+                <a:solidFill>
+                  <a:srgbClr val="000000"/>
+                </a:solidFill>
+                <a:latin typeface="Calibri"/>
+              </a:rPr>
+              <a:t>does</a:t>
+            </a:r>
+            <a:r>
+              <a:rPr lang="da-DK" sz="2400" b="0" strike="noStrike" spc="-1" dirty="0">
+                <a:solidFill>
+                  <a:srgbClr val="000000"/>
+                </a:solidFill>
+                <a:latin typeface="Calibri"/>
+              </a:rPr>
+              <a:t> </a:t>
+            </a:r>
+            <a:r>
+              <a:rPr lang="da-DK" sz="2400" b="0" strike="noStrike" spc="-1" dirty="0" err="1">
+                <a:solidFill>
+                  <a:srgbClr val="000000"/>
+                </a:solidFill>
+                <a:latin typeface="Calibri"/>
+              </a:rPr>
+              <a:t>this</a:t>
+            </a:r>
+            <a:r>
+              <a:rPr lang="da-DK" sz="2400" b="0" strike="noStrike" spc="-1" dirty="0">
+                <a:solidFill>
+                  <a:srgbClr val="000000"/>
+                </a:solidFill>
+                <a:latin typeface="Calibri"/>
+              </a:rPr>
+              <a:t> </a:t>
+            </a:r>
+            <a:r>
+              <a:rPr lang="da-DK" sz="2400" b="0" strike="noStrike" spc="-1" dirty="0" err="1">
+                <a:solidFill>
+                  <a:srgbClr val="000000"/>
+                </a:solidFill>
+                <a:latin typeface="Calibri"/>
+              </a:rPr>
+              <a:t>mean</a:t>
+            </a:r>
+            <a:r>
+              <a:rPr lang="da-DK" sz="2400" b="0" strike="noStrike" spc="-1" dirty="0">
+                <a:solidFill>
+                  <a:srgbClr val="000000"/>
+                </a:solidFill>
+                <a:latin typeface="Calibri"/>
+              </a:rPr>
+              <a:t>?</a:t>
+            </a:r>
+            <a:endParaRPr lang="en-US" sz="2400" b="0" strike="noStrike" spc="-1" dirty="0">
               <a:solidFill>
                 <a:srgbClr val="000000"/>
               </a:solidFill>
@@ -19658,7 +19775,7 @@
                 <a:spcPts val="479"/>
               </a:spcBef>
             </a:pPr>
-            <a:endParaRPr lang="en-US" sz="2400" b="0" strike="noStrike" spc="-1">
+            <a:endParaRPr lang="en-US" sz="2400" b="0" strike="noStrike" spc="-1" dirty="0">
               <a:solidFill>
                 <a:srgbClr val="000000"/>
               </a:solidFill>
@@ -19680,33 +19797,150 @@
               <a:buChar char="•"/>
             </a:pPr>
             <a:r>
-              <a:rPr lang="da-DK" sz="2400" b="0" strike="noStrike" spc="-1">
+              <a:rPr lang="da-DK" sz="2400" b="0" strike="noStrike" spc="-1" dirty="0" err="1">
                 <a:solidFill>
                   <a:srgbClr val="000000"/>
                 </a:solidFill>
                 <a:latin typeface="Calibri"/>
               </a:rPr>
-              <a:t>Inheritance of </a:t>
-            </a:r>
-            <a:r>
-              <a:rPr lang="da-DK" sz="2400" b="0" i="1" strike="noStrike" spc="-1">
+              <a:t>Inheritance</a:t>
+            </a:r>
+            <a:r>
+              <a:rPr lang="da-DK" sz="2400" b="0" strike="noStrike" spc="-1" dirty="0">
                 <a:solidFill>
                   <a:srgbClr val="000000"/>
                 </a:solidFill>
                 <a:latin typeface="Calibri"/>
               </a:rPr>
+              <a:t> of </a:t>
+            </a:r>
+            <a:r>
+              <a:rPr lang="da-DK" sz="2400" b="0" i="1" strike="noStrike" spc="-1" dirty="0" err="1">
+                <a:solidFill>
+                  <a:srgbClr val="000000"/>
+                </a:solidFill>
+                <a:latin typeface="Calibri"/>
+              </a:rPr>
               <a:t>implementation</a:t>
             </a:r>
             <a:r>
-              <a:rPr lang="da-DK" sz="2400" b="0" strike="noStrike" spc="-1">
+              <a:rPr lang="da-DK" sz="2400" b="0" strike="noStrike" spc="-1" dirty="0">
                 <a:solidFill>
                   <a:srgbClr val="000000"/>
                 </a:solidFill>
                 <a:latin typeface="Calibri"/>
               </a:rPr>
-              <a:t>: Subclasses can re-use methods etc. from superclass (under what circumstances?)</a:t>
-            </a:r>
-            <a:endParaRPr lang="en-US" sz="2400" b="0" strike="noStrike" spc="-1">
+              <a:t>: </a:t>
+            </a:r>
+            <a:r>
+              <a:rPr lang="da-DK" sz="2400" b="0" strike="noStrike" spc="-1" dirty="0" err="1">
+                <a:solidFill>
+                  <a:srgbClr val="000000"/>
+                </a:solidFill>
+                <a:latin typeface="Calibri"/>
+              </a:rPr>
+              <a:t>Subclasses</a:t>
+            </a:r>
+            <a:r>
+              <a:rPr lang="da-DK" sz="2400" b="0" strike="noStrike" spc="-1" dirty="0">
+                <a:solidFill>
+                  <a:srgbClr val="000000"/>
+                </a:solidFill>
+                <a:latin typeface="Calibri"/>
+              </a:rPr>
+              <a:t> </a:t>
+            </a:r>
+            <a:r>
+              <a:rPr lang="da-DK" sz="2400" b="0" strike="noStrike" spc="-1" dirty="0" err="1">
+                <a:solidFill>
+                  <a:srgbClr val="000000"/>
+                </a:solidFill>
+                <a:latin typeface="Calibri"/>
+              </a:rPr>
+              <a:t>can</a:t>
+            </a:r>
+            <a:r>
+              <a:rPr lang="da-DK" sz="2400" b="0" strike="noStrike" spc="-1" dirty="0">
+                <a:solidFill>
+                  <a:srgbClr val="000000"/>
+                </a:solidFill>
+                <a:latin typeface="Calibri"/>
+              </a:rPr>
+              <a:t> re-</a:t>
+            </a:r>
+            <a:r>
+              <a:rPr lang="da-DK" sz="2400" b="0" strike="noStrike" spc="-1" dirty="0" err="1">
+                <a:solidFill>
+                  <a:srgbClr val="000000"/>
+                </a:solidFill>
+                <a:latin typeface="Calibri"/>
+              </a:rPr>
+              <a:t>use</a:t>
+            </a:r>
+            <a:r>
+              <a:rPr lang="da-DK" sz="2400" b="0" strike="noStrike" spc="-1" dirty="0">
+                <a:solidFill>
+                  <a:srgbClr val="000000"/>
+                </a:solidFill>
+                <a:latin typeface="Calibri"/>
+              </a:rPr>
+              <a:t> </a:t>
+            </a:r>
+            <a:r>
+              <a:rPr lang="da-DK" sz="2400" b="0" strike="noStrike" spc="-1" dirty="0" err="1">
+                <a:solidFill>
+                  <a:srgbClr val="000000"/>
+                </a:solidFill>
+                <a:latin typeface="Calibri"/>
+              </a:rPr>
+              <a:t>methods</a:t>
+            </a:r>
+            <a:r>
+              <a:rPr lang="da-DK" sz="2400" b="0" strike="noStrike" spc="-1" dirty="0">
+                <a:solidFill>
+                  <a:srgbClr val="000000"/>
+                </a:solidFill>
+                <a:latin typeface="Calibri"/>
+              </a:rPr>
+              <a:t> etc. from superclass (under </a:t>
+            </a:r>
+            <a:r>
+              <a:rPr lang="da-DK" sz="2400" b="0" strike="noStrike" spc="-1" dirty="0" err="1">
+                <a:solidFill>
+                  <a:srgbClr val="000000"/>
+                </a:solidFill>
+                <a:latin typeface="Calibri"/>
+              </a:rPr>
+              <a:t>what</a:t>
+            </a:r>
+            <a:r>
+              <a:rPr lang="da-DK" sz="2400" b="0" strike="noStrike" spc="-1" dirty="0">
+                <a:solidFill>
+                  <a:srgbClr val="000000"/>
+                </a:solidFill>
+                <a:latin typeface="Calibri"/>
+              </a:rPr>
+              <a:t> </a:t>
+            </a:r>
+            <a:r>
+              <a:rPr lang="da-DK" sz="2400" b="0" strike="noStrike" spc="-1" dirty="0" err="1">
+                <a:solidFill>
+                  <a:srgbClr val="000000"/>
+                </a:solidFill>
+                <a:latin typeface="Calibri"/>
+              </a:rPr>
+              <a:t>circumstances</a:t>
+            </a:r>
+            <a:r>
+              <a:rPr lang="da-DK" sz="2400" b="0" strike="noStrike" spc="-1" dirty="0">
+                <a:solidFill>
+                  <a:srgbClr val="000000"/>
+                </a:solidFill>
+                <a:latin typeface="Calibri"/>
+              </a:rPr>
+              <a:t>?)</a:t>
+            </a:r>
+            <a:endParaRPr lang="en-US" sz="2400" b="0" strike="noStrike" spc="-1" dirty="0">
               <a:solidFill>
                 <a:srgbClr val="000000"/>
               </a:solidFill>
@@ -19722,7 +19956,7 @@
                 <a:spcPts val="479"/>
               </a:spcBef>
             </a:pPr>
-            <a:endParaRPr lang="en-US" sz="2400" b="0" strike="noStrike" spc="-1">
+            <a:endParaRPr lang="en-US" sz="2400" b="0" strike="noStrike" spc="-1" dirty="0">
               <a:solidFill>
                 <a:srgbClr val="000000"/>
               </a:solidFill>
@@ -19744,33 +19978,96 @@
               <a:buChar char="•"/>
             </a:pPr>
             <a:r>
-              <a:rPr lang="da-DK" sz="2400" b="0" strike="noStrike" spc="-1">
+              <a:rPr lang="da-DK" sz="2400" b="0" strike="noStrike" spc="-1" dirty="0" err="1">
                 <a:solidFill>
                   <a:srgbClr val="000000"/>
                 </a:solidFill>
                 <a:latin typeface="Calibri"/>
               </a:rPr>
-              <a:t>Inheritance of </a:t>
-            </a:r>
-            <a:r>
-              <a:rPr lang="da-DK" sz="2400" b="0" i="1" strike="noStrike" spc="-1">
+              <a:t>Inheritance</a:t>
+            </a:r>
+            <a:r>
+              <a:rPr lang="da-DK" sz="2400" b="0" strike="noStrike" spc="-1" dirty="0">
                 <a:solidFill>
                   <a:srgbClr val="000000"/>
                 </a:solidFill>
                 <a:latin typeface="Calibri"/>
               </a:rPr>
+              <a:t> of </a:t>
+            </a:r>
+            <a:r>
+              <a:rPr lang="da-DK" sz="2400" b="0" i="1" strike="noStrike" spc="-1" dirty="0" err="1">
+                <a:solidFill>
+                  <a:srgbClr val="000000"/>
+                </a:solidFill>
+                <a:latin typeface="Calibri"/>
+              </a:rPr>
               <a:t>identity</a:t>
             </a:r>
             <a:r>
-              <a:rPr lang="da-DK" sz="2400" b="0" strike="noStrike" spc="-1">
+              <a:rPr lang="da-DK" sz="2400" b="0" strike="noStrike" spc="-1" dirty="0">
                 <a:solidFill>
                   <a:srgbClr val="000000"/>
                 </a:solidFill>
                 <a:latin typeface="Calibri"/>
               </a:rPr>
-              <a:t>: Subclasses may substitute s</a:t>
-            </a:r>
-            <a:endParaRPr lang="en-US" sz="2400" b="0" strike="noStrike" spc="-1">
+              <a:t>: </a:t>
+            </a:r>
+            <a:r>
+              <a:rPr lang="da-DK" sz="2400" b="0" strike="noStrike" spc="-1" dirty="0" err="1">
+                <a:solidFill>
+                  <a:srgbClr val="000000"/>
+                </a:solidFill>
+                <a:latin typeface="Calibri"/>
+              </a:rPr>
+              <a:t>Subclasses</a:t>
+            </a:r>
+            <a:r>
+              <a:rPr lang="da-DK" sz="2400" b="0" strike="noStrike" spc="-1" dirty="0">
+                <a:solidFill>
+                  <a:srgbClr val="000000"/>
+                </a:solidFill>
+                <a:latin typeface="Calibri"/>
+              </a:rPr>
+              <a:t> </a:t>
+            </a:r>
+            <a:r>
+              <a:rPr lang="da-DK" sz="2400" b="0" strike="noStrike" spc="-1" dirty="0" err="1">
+                <a:solidFill>
+                  <a:srgbClr val="000000"/>
+                </a:solidFill>
+                <a:latin typeface="Calibri"/>
+              </a:rPr>
+              <a:t>may</a:t>
+            </a:r>
+            <a:r>
+              <a:rPr lang="da-DK" sz="2400" b="0" strike="noStrike" spc="-1" dirty="0">
+                <a:solidFill>
+                  <a:srgbClr val="000000"/>
+                </a:solidFill>
+                <a:latin typeface="Calibri"/>
+              </a:rPr>
+              <a:t> </a:t>
+            </a:r>
+            <a:r>
+              <a:rPr lang="da-DK" sz="2400" b="0" strike="noStrike" spc="-1" dirty="0" err="1">
+                <a:solidFill>
+                  <a:srgbClr val="000000"/>
+                </a:solidFill>
+                <a:latin typeface="Calibri"/>
+              </a:rPr>
+              <a:t>substitute</a:t>
+            </a:r>
+            <a:r>
+              <a:rPr lang="da-DK" sz="2400" b="0" strike="noStrike" spc="-1" dirty="0">
+                <a:solidFill>
+                  <a:srgbClr val="000000"/>
+                </a:solidFill>
+                <a:latin typeface="Calibri"/>
+              </a:rPr>
+              <a:t> s</a:t>
+            </a:r>
+            <a:endParaRPr lang="en-US" sz="2400" b="0" strike="noStrike" spc="-1" dirty="0">
               <a:solidFill>
                 <a:srgbClr val="000000"/>
               </a:solidFill>
@@ -19811,7 +20108,7 @@
     <mc:Choice Requires="p14">
       <p:transition p14:dur="10"/>
     </mc:Choice>
-    <mc:Fallback xmlns:p15="http://schemas.microsoft.com/office/powerpoint/2012/main" xmlns="">
+    <mc:Fallback xmlns="" xmlns:p15="http://schemas.microsoft.com/office/powerpoint/2012/main">
       <p:transition/>
     </mc:Fallback>
   </mc:AlternateContent>
@@ -20709,7 +21006,7 @@
     <mc:Choice Requires="p14">
       <p:transition p14:dur="10"/>
     </mc:Choice>
-    <mc:Fallback xmlns:p15="http://schemas.microsoft.com/office/powerpoint/2012/main" xmlns="">
+    <mc:Fallback xmlns="" xmlns:p15="http://schemas.microsoft.com/office/powerpoint/2012/main">
       <p:transition/>
     </mc:Fallback>
   </mc:AlternateContent>
@@ -21208,7 +21505,7 @@
     <mc:Choice Requires="p14">
       <p:transition p14:dur="10"/>
     </mc:Choice>
-    <mc:Fallback xmlns:p15="http://schemas.microsoft.com/office/powerpoint/2012/main" xmlns="">
+    <mc:Fallback xmlns="" xmlns:p15="http://schemas.microsoft.com/office/powerpoint/2012/main">
       <p:transition/>
     </mc:Fallback>
   </mc:AlternateContent>
@@ -22056,7 +22353,7 @@
     <mc:Choice Requires="p14">
       <p:transition p14:dur="10"/>
     </mc:Choice>
-    <mc:Fallback xmlns:p15="http://schemas.microsoft.com/office/powerpoint/2012/main" xmlns="">
+    <mc:Fallback xmlns="" xmlns:p15="http://schemas.microsoft.com/office/powerpoint/2012/main">
       <p:transition/>
     </mc:Fallback>
   </mc:AlternateContent>
@@ -22364,7 +22661,7 @@
     <mc:Choice Requires="p14">
       <p:transition p14:dur="10"/>
     </mc:Choice>
-    <mc:Fallback xmlns:p15="http://schemas.microsoft.com/office/powerpoint/2012/main" xmlns="">
+    <mc:Fallback xmlns="" xmlns:p15="http://schemas.microsoft.com/office/powerpoint/2012/main">
       <p:transition/>
     </mc:Fallback>
   </mc:AlternateContent>
@@ -22519,7 +22816,7 @@
     <mc:Choice Requires="p14">
       <p:transition p14:dur="10"/>
     </mc:Choice>
-    <mc:Fallback xmlns:p15="http://schemas.microsoft.com/office/powerpoint/2012/main" xmlns="">
+    <mc:Fallback xmlns="" xmlns:p15="http://schemas.microsoft.com/office/powerpoint/2012/main">
       <p:transition/>
     </mc:Fallback>
   </mc:AlternateContent>

</xml_diff>